<commit_message>
User stories slide updates
</commit_message>
<xml_diff>
--- a/public/handouts/Slides 2.1 User Stories.pptx
+++ b/public/handouts/Slides 2.1 User Stories.pptx
@@ -14,7 +14,7 @@
     <p:sldId id="498" r:id="rId5"/>
     <p:sldId id="550" r:id="rId6"/>
     <p:sldId id="551" r:id="rId7"/>
-    <p:sldId id="568" r:id="rId8"/>
+    <p:sldId id="570" r:id="rId8"/>
     <p:sldId id="552" r:id="rId9"/>
     <p:sldId id="553" r:id="rId10"/>
     <p:sldId id="554" r:id="rId11"/>
@@ -215,7 +215,7 @@
           <a:p>
             <a:fld id="{7C7E5181-6CF5-45F7-A87A-E0E0B1FD7549}" type="datetimeFigureOut">
               <a:rPr lang="en-US" smtClean="0"/>
-              <a:t>5/4/25</a:t>
+              <a:t>5/5/25</a:t>
             </a:fld>
             <a:endParaRPr lang="en-US"/>
           </a:p>
@@ -2371,7 +2371,7 @@
           <a:p>
             <a:fld id="{5D2A64DE-480B-420F-9649-4F8E696E08E0}" type="datetime1">
               <a:rPr lang="en-US" smtClean="0"/>
-              <a:t>5/3/25</a:t>
+              <a:t>5/5/25</a:t>
             </a:fld>
             <a:endParaRPr lang="en-US"/>
           </a:p>
@@ -2791,7 +2791,7 @@
           <a:p>
             <a:fld id="{07C7BFD4-467E-4EDE-93EA-052F5B39A4E5}" type="datetime1">
               <a:rPr lang="en-US" smtClean="0"/>
-              <a:t>5/3/25</a:t>
+              <a:t>5/5/25</a:t>
             </a:fld>
             <a:endParaRPr lang="en-US"/>
           </a:p>
@@ -2940,7 +2940,7 @@
           <a:p>
             <a:fld id="{109E55A0-C911-4F03-82FC-7E5926047D46}" type="datetime1">
               <a:rPr lang="en-US" smtClean="0"/>
-              <a:t>5/3/25</a:t>
+              <a:t>5/5/25</a:t>
             </a:fld>
             <a:endParaRPr lang="en-US"/>
           </a:p>
@@ -3128,7 +3128,7 @@
           <a:p>
             <a:fld id="{2B7B7EE0-7771-4CD5-9B2B-3550753A54A1}" type="datetime1">
               <a:rPr lang="en-US" smtClean="0"/>
-              <a:t>5/3/25</a:t>
+              <a:t>5/5/25</a:t>
             </a:fld>
             <a:endParaRPr lang="en-US"/>
           </a:p>
@@ -3369,7 +3369,7 @@
           <a:p>
             <a:fld id="{54D997E8-DDEE-43F1-8D9B-F8A1E11DE488}" type="datetime1">
               <a:rPr lang="en-US" smtClean="0"/>
-              <a:t>5/3/25</a:t>
+              <a:t>5/5/25</a:t>
             </a:fld>
             <a:endParaRPr lang="en-US"/>
           </a:p>
@@ -5001,30 +5001,30 @@
           <a:lstStyle/>
           <a:p>
             <a:r>
+              <a:rPr lang="en-US" dirty="0"/>
+              <a:t>1.1 I should be able to report the location of a pothole to the system (E)</a:t>
+            </a:r>
+          </a:p>
+          <a:p>
+            <a:r>
+              <a:rPr lang="en-US" dirty="0"/>
+              <a:t>1.2 I should be able to see whether the pothole I report has been repaired (E)</a:t>
+            </a:r>
+          </a:p>
+          <a:p>
+            <a:r>
               <a:rPr lang="en-US"/>
-              <a:t>1.1 I should be able to report the location of a pothole to the system (E)</a:t>
-            </a:r>
-          </a:p>
-          <a:p>
-            <a:r>
-              <a:rPr lang="en-US"/>
-              <a:t>1.2 I should be able to see whether the pothole I report has been repaired (E)</a:t>
-            </a:r>
-          </a:p>
-          <a:p>
-            <a:r>
-              <a:rPr lang="en-US"/>
-              <a:t>1.3 I should be able to see whether others have reported potholes hear me (D)</a:t>
-            </a:r>
-          </a:p>
-          <a:p>
-            <a:r>
-              <a:rPr lang="en-US"/>
+              <a:t>1.3 I should be able to see whether others have reported potholes near me (D)</a:t>
+            </a:r>
+          </a:p>
+          <a:p>
+            <a:r>
+              <a:rPr lang="en-US" dirty="0"/>
               <a:t>1.4 I should be able to see an estimated time when the pothole should be repaired (X)</a:t>
             </a:r>
           </a:p>
           <a:p>
-            <a:endParaRPr lang="en-US"/>
+            <a:endParaRPr lang="en-US" dirty="0"/>
           </a:p>
         </p:txBody>
       </p:sp>
@@ -10732,28 +10732,35 @@
           <a:lstStyle/>
           <a:p>
             <a:r>
-              <a:rPr lang="en-US"/>
+              <a:rPr lang="en-US" dirty="0"/>
               <a:t>A capability is not a product</a:t>
             </a:r>
           </a:p>
           <a:p>
             <a:pPr lvl="1"/>
             <a:r>
-              <a:rPr lang="en-US"/>
+              <a:rPr lang="en-US" dirty="0"/>
               <a:t>“As a College Administrator, I want a web application that does &lt;this&gt; and &lt;that&gt; so that I can…” is not a user story!</a:t>
             </a:r>
           </a:p>
           <a:p>
             <a:pPr lvl="1"/>
             <a:r>
-              <a:rPr lang="en-US"/>
-              <a:t>This is easy wrong in practice! Sometimes you really want to build a tic-tac-toe game.</a:t>
+              <a:rPr lang="en-US" dirty="0"/>
+              <a:t>This is easy to get wrong in practice! </a:t>
+            </a:r>
+            <a:br>
+              <a:rPr lang="en-US" dirty="0"/>
+            </a:br>
+            <a:r>
+              <a:rPr lang="en-US" dirty="0"/>
+              <a:t>Sometimes you really want to build a tic-tac-toe game.</a:t>
             </a:r>
           </a:p>
           <a:p>
             <a:pPr lvl="1"/>
             <a:r>
-              <a:rPr lang="en-US"/>
+              <a:rPr lang="en-US" dirty="0"/>
               <a:t>You’re supposed to ask “do I even need to build this?”</a:t>
             </a:r>
           </a:p>
@@ -10785,75 +10792,12 @@
           <a:bodyPr/>
           <a:lstStyle/>
           <a:p>
-            <a:pPr marL="0" marR="0" lvl="0" indent="0" algn="r" defTabSz="914400" rtl="0" eaLnBrk="1" fontAlgn="auto" latinLnBrk="0" hangingPunct="1">
-              <a:lnSpc>
-                <a:spcPct val="100000"/>
-              </a:lnSpc>
-              <a:spcBef>
-                <a:spcPts val="0"/>
-              </a:spcBef>
-              <a:spcAft>
-                <a:spcPts val="0"/>
-              </a:spcAft>
-              <a:buClrTx/>
-              <a:buSzTx/>
-              <a:buFontTx/>
-              <a:buNone/>
-              <a:tabLst/>
-              <a:defRPr/>
-            </a:pPr>
             <a:fld id="{86CB4B4D-7CA3-9044-876B-883B54F8677D}" type="slidenum">
-              <a:rPr kumimoji="0" lang="en-US" sz="1200" b="0" i="0" u="none" strike="noStrike" kern="1200" cap="none" spc="0" normalizeH="0" baseline="0" noProof="0" smtClean="0">
-                <a:ln>
-                  <a:noFill/>
-                </a:ln>
-                <a:solidFill>
-                  <a:prstClr val="black">
-                    <a:tint val="75000"/>
-                  </a:prstClr>
-                </a:solidFill>
-                <a:effectLst/>
-                <a:uLnTx/>
-                <a:uFillTx/>
-                <a:latin typeface="Calibri" panose="020F0502020204030204"/>
-                <a:ea typeface="+mn-ea"/>
-                <a:cs typeface="+mn-cs"/>
-              </a:rPr>
-              <a:pPr marL="0" marR="0" lvl="0" indent="0" algn="r" defTabSz="914400" rtl="0" eaLnBrk="1" fontAlgn="auto" latinLnBrk="0" hangingPunct="1">
-                <a:lnSpc>
-                  <a:spcPct val="100000"/>
-                </a:lnSpc>
-                <a:spcBef>
-                  <a:spcPts val="0"/>
-                </a:spcBef>
-                <a:spcAft>
-                  <a:spcPts val="0"/>
-                </a:spcAft>
-                <a:buClrTx/>
-                <a:buSzTx/>
-                <a:buFontTx/>
-                <a:buNone/>
-                <a:tabLst/>
-                <a:defRPr/>
-              </a:pPr>
+              <a:rPr lang="en-US" smtClean="0"/>
+              <a:pPr/>
               <a:t>7</a:t>
             </a:fld>
-            <a:endParaRPr kumimoji="0" lang="en-US" sz="1200" b="0" i="0" u="none" strike="noStrike" kern="1200" cap="none" spc="0" normalizeH="0" baseline="0" noProof="0">
-              <a:ln>
-                <a:noFill/>
-              </a:ln>
-              <a:solidFill>
-                <a:prstClr val="black">
-                  <a:tint val="75000"/>
-                </a:prstClr>
-              </a:solidFill>
-              <a:effectLst/>
-              <a:uLnTx/>
-              <a:uFillTx/>
-              <a:latin typeface="Calibri" panose="020F0502020204030204"/>
-              <a:ea typeface="+mn-ea"/>
-              <a:cs typeface="+mn-cs"/>
-            </a:endParaRPr>
+            <a:endParaRPr lang="en-US"/>
           </a:p>
         </p:txBody>
       </p:sp>
@@ -10907,103 +10851,46 @@
           </a:bodyPr>
           <a:lstStyle/>
           <a:p>
-            <a:pPr marL="0" marR="0" lvl="0" indent="0" algn="l" defTabSz="914400" rtl="0" eaLnBrk="1" fontAlgn="auto" latinLnBrk="0" hangingPunct="1">
-              <a:lnSpc>
-                <a:spcPct val="100000"/>
-              </a:lnSpc>
-              <a:spcBef>
-                <a:spcPts val="0"/>
-              </a:spcBef>
-              <a:spcAft>
-                <a:spcPts val="0"/>
-              </a:spcAft>
-              <a:buClrTx/>
-              <a:buSzTx/>
-              <a:buFontTx/>
-              <a:buNone/>
-              <a:tabLst/>
-              <a:defRPr/>
-            </a:pPr>
-            <a:r>
-              <a:rPr kumimoji="0" lang="en-US" sz="3200" b="1" i="1" u="none" strike="noStrike" kern="1200" cap="none" spc="0" normalizeH="0" baseline="0" noProof="0">
-                <a:ln>
-                  <a:noFill/>
-                </a:ln>
+            <a:r>
+              <a:rPr lang="en-US" sz="3200" b="1" i="1" dirty="0">
                 <a:solidFill>
                   <a:srgbClr val="FF0000"/>
                 </a:solidFill>
-                <a:effectLst/>
-                <a:uLnTx/>
-                <a:uFillTx/>
                 <a:latin typeface="Ink Free" panose="03080402000500000000" pitchFamily="66" charset="0"/>
-                <a:ea typeface="+mn-ea"/>
-                <a:cs typeface="+mn-cs"/>
               </a:rPr>
               <a:t>As a &lt;role&gt; </a:t>
             </a:r>
             <a:br>
-              <a:rPr kumimoji="0" lang="en-US" sz="3200" b="1" i="1" u="none" strike="noStrike" kern="1200" cap="none" spc="0" normalizeH="0" baseline="0" noProof="0">
-                <a:ln>
-                  <a:noFill/>
-                </a:ln>
+              <a:rPr lang="en-US" sz="3200" b="1" i="1" dirty="0">
                 <a:solidFill>
                   <a:srgbClr val="FF0000"/>
                 </a:solidFill>
-                <a:effectLst/>
-                <a:uLnTx/>
-                <a:uFillTx/>
                 <a:latin typeface="Ink Free" panose="03080402000500000000" pitchFamily="66" charset="0"/>
-                <a:ea typeface="+mn-ea"/>
-                <a:cs typeface="+mn-cs"/>
               </a:rPr>
             </a:br>
             <a:r>
-              <a:rPr kumimoji="0" lang="en-US" sz="3200" b="1" i="1" u="none" strike="noStrike" kern="1200" cap="none" spc="0" normalizeH="0" baseline="0" noProof="0">
-                <a:ln>
-                  <a:noFill/>
-                </a:ln>
+              <a:rPr lang="en-US" sz="3200" b="1" i="1" dirty="0">
                 <a:solidFill>
                   <a:srgbClr val="FF0000"/>
                 </a:solidFill>
-                <a:effectLst/>
-                <a:uLnTx/>
-                <a:uFillTx/>
                 <a:latin typeface="Ink Free" panose="03080402000500000000" pitchFamily="66" charset="0"/>
-                <a:ea typeface="+mn-ea"/>
-                <a:cs typeface="+mn-cs"/>
               </a:rPr>
               <a:t>I want &lt;capability&gt; </a:t>
             </a:r>
             <a:br>
-              <a:rPr kumimoji="0" lang="en-US" sz="3200" b="1" i="1" u="none" strike="noStrike" kern="1200" cap="none" spc="0" normalizeH="0" baseline="0" noProof="0">
-                <a:ln>
-                  <a:noFill/>
-                </a:ln>
+              <a:rPr lang="en-US" sz="3200" b="1" i="1" dirty="0">
                 <a:solidFill>
                   <a:srgbClr val="FF0000"/>
                 </a:solidFill>
-                <a:effectLst/>
-                <a:uLnTx/>
-                <a:uFillTx/>
                 <a:latin typeface="Ink Free" panose="03080402000500000000" pitchFamily="66" charset="0"/>
-                <a:ea typeface="+mn-ea"/>
-                <a:cs typeface="+mn-cs"/>
               </a:rPr>
             </a:br>
             <a:r>
-              <a:rPr kumimoji="0" lang="en-US" sz="3200" b="1" i="1" u="none" strike="noStrike" kern="1200" cap="none" spc="0" normalizeH="0" baseline="0" noProof="0">
-                <a:ln>
-                  <a:noFill/>
-                </a:ln>
+              <a:rPr lang="en-US" sz="3200" b="1" i="1" dirty="0">
                 <a:solidFill>
                   <a:srgbClr val="FF0000"/>
                 </a:solidFill>
-                <a:effectLst/>
-                <a:uLnTx/>
-                <a:uFillTx/>
                 <a:latin typeface="Ink Free" panose="03080402000500000000" pitchFamily="66" charset="0"/>
-                <a:ea typeface="+mn-ea"/>
-                <a:cs typeface="+mn-cs"/>
               </a:rPr>
               <a:t>so that I can &lt;get some benefit&gt;</a:t>
             </a:r>
@@ -11013,7 +10900,7 @@
     </p:spTree>
     <p:extLst>
       <p:ext uri="{BB962C8B-B14F-4D97-AF65-F5344CB8AC3E}">
-        <p14:creationId xmlns:p14="http://schemas.microsoft.com/office/powerpoint/2010/main" val="1963249221"/>
+        <p14:creationId xmlns:p14="http://schemas.microsoft.com/office/powerpoint/2010/main" val="2730188382"/>
       </p:ext>
     </p:extLst>
   </p:cSld>

</xml_diff>